<commit_message>
Updated Parameter search and result for KNN
</commit_message>
<xml_diff>
--- a/Task 3 (1).pptx
+++ b/Task 3 (1).pptx
@@ -3872,7 +3872,7 @@
           <a:p>
             <a:r>
               <a:rPr lang="en-GB" dirty="0"/>
-              <a:t>KNN: Parameter Grid Search / best parameters</a:t>
+              <a:t>KNN: Parameter Search / best parameters (2)</a:t>
             </a:r>
           </a:p>
         </p:txBody>
@@ -3895,12 +3895,82 @@
         </p:nvSpPr>
         <p:spPr/>
         <p:txBody>
-          <a:bodyPr/>
-          <a:lstStyle/>
-          <a:p>
-            <a:r>
-              <a:rPr lang="en-GB" dirty="0"/>
-              <a:t>Best parameters:</a:t>
+          <a:bodyPr>
+            <a:normAutofit/>
+          </a:bodyPr>
+          <a:lstStyle/>
+          <a:p>
+            <a:r>
+              <a:rPr lang="en-GB" sz="2400" dirty="0"/>
+              <a:t>Options for Randomized Search:</a:t>
+            </a:r>
+          </a:p>
+          <a:p>
+            <a:pPr lvl="1"/>
+            <a:r>
+              <a:rPr lang="en-GB" sz="2000" dirty="0"/>
+              <a:t>Number of neighbours: [2, 5, 10, 12, 16,18]</a:t>
+            </a:r>
+          </a:p>
+          <a:p>
+            <a:pPr lvl="1"/>
+            <a:r>
+              <a:rPr lang="en-GB" sz="2000" dirty="0"/>
+              <a:t>Weights: [uniform, distance]</a:t>
+            </a:r>
+          </a:p>
+          <a:p>
+            <a:pPr lvl="1"/>
+            <a:r>
+              <a:rPr lang="en-GB" sz="2000" dirty="0"/>
+              <a:t>Algorithm: [auto, ball tree, </a:t>
+            </a:r>
+            <a:r>
+              <a:rPr lang="en-GB" sz="2000" dirty="0" err="1"/>
+              <a:t>kd</a:t>
+            </a:r>
+            <a:r>
+              <a:rPr lang="en-GB" sz="2000" dirty="0"/>
+              <a:t> tree, brute]</a:t>
+            </a:r>
+          </a:p>
+          <a:p>
+            <a:r>
+              <a:rPr lang="en-GB" sz="2400" dirty="0"/>
+              <a:t>From this one could observe that 10/12 neighbours, distance for weights and ball tree or brute as the algorithm performed the best</a:t>
+            </a:r>
+          </a:p>
+          <a:p>
+            <a:r>
+              <a:rPr lang="en-GB" sz="2400" dirty="0"/>
+              <a:t>Therefore a Grid-search with the following parameters was performed:</a:t>
+            </a:r>
+          </a:p>
+          <a:p>
+            <a:pPr lvl="1"/>
+            <a:r>
+              <a:rPr lang="en-GB" sz="2000" dirty="0"/>
+              <a:t>Number of neighbours: [10, 11, 12]</a:t>
+            </a:r>
+          </a:p>
+          <a:p>
+            <a:pPr lvl="1"/>
+            <a:r>
+              <a:rPr lang="en-GB" sz="2000" dirty="0"/>
+              <a:t>Weights: [distance]</a:t>
+            </a:r>
+          </a:p>
+          <a:p>
+            <a:pPr lvl="1"/>
+            <a:r>
+              <a:rPr lang="en-GB" sz="2000" dirty="0"/>
+              <a:t>Algorithm: [ball tree, brute]</a:t>
+            </a:r>
+          </a:p>
+          <a:p>
+            <a:r>
+              <a:rPr lang="en-GB" sz="2400" dirty="0"/>
+              <a:t>Resulting best parameters: “10”, “distance” and “brute”</a:t>
             </a:r>
           </a:p>
         </p:txBody>
@@ -3990,10 +4060,10 @@
       </p:sp>
       <p:pic>
         <p:nvPicPr>
-          <p:cNvPr id="7" name="Inhaltsplatzhalter 6">
-            <a:extLst>
-              <a:ext uri="{FF2B5EF4-FFF2-40B4-BE49-F238E27FC236}">
-                <a16:creationId xmlns:a16="http://schemas.microsoft.com/office/drawing/2014/main" id="{628C84FC-FA60-9207-0A8E-7EFC4A07400E}"/>
+          <p:cNvPr id="10" name="Inhaltsplatzhalter 9">
+            <a:extLst>
+              <a:ext uri="{FF2B5EF4-FFF2-40B4-BE49-F238E27FC236}">
+                <a16:creationId xmlns:a16="http://schemas.microsoft.com/office/drawing/2014/main" id="{65039FBE-EA6F-58D3-D855-38A769EE7FA2}"/>
               </a:ext>
             </a:extLst>
           </p:cNvPr>
@@ -4012,8 +4082,8 @@
         </p:blipFill>
         <p:spPr>
           <a:xfrm>
-            <a:off x="1194980" y="1825625"/>
-            <a:ext cx="4040527" cy="4351338"/>
+            <a:off x="1435806" y="1825625"/>
+            <a:ext cx="3986387" cy="4351338"/>
           </a:xfrm>
         </p:spPr>
       </p:pic>
@@ -7000,7 +7070,7 @@
           <a:p>
             <a:r>
               <a:rPr lang="en-GB" dirty="0"/>
-              <a:t>KNN: Parameter Grid Search / best parameters</a:t>
+              <a:t>KNN: Parameter Search / best parameters (1)</a:t>
             </a:r>
           </a:p>
         </p:txBody>
@@ -7029,75 +7099,40 @@
         </p:spPr>
         <p:txBody>
           <a:bodyPr>
-            <a:normAutofit fontScale="92500"/>
+            <a:normAutofit/>
           </a:bodyPr>
           <a:lstStyle/>
           <a:p>
             <a:r>
-              <a:rPr lang="en-GB" dirty="0"/>
+              <a:rPr lang="en-GB" sz="2400" dirty="0"/>
               <a:t>Number of features:</a:t>
             </a:r>
           </a:p>
           <a:p>
             <a:pPr lvl="1"/>
             <a:r>
-              <a:rPr lang="en-GB" dirty="0"/>
+              <a:rPr lang="en-GB" sz="2000" dirty="0"/>
               <a:t>Several different numbers of features were tried </a:t>
             </a:r>
           </a:p>
           <a:p>
             <a:pPr lvl="1"/>
             <a:r>
-              <a:rPr lang="en-GB" dirty="0"/>
+              <a:rPr lang="en-GB" sz="2000" dirty="0"/>
               <a:t>For 50 features the performance was already rather good</a:t>
             </a:r>
           </a:p>
           <a:p>
             <a:pPr lvl="1"/>
             <a:r>
-              <a:rPr lang="en-GB" dirty="0"/>
+              <a:rPr lang="en-GB" sz="2000" dirty="0"/>
               <a:t>Using more features only increased the performance by a bit but heavily increased the training and prediction time</a:t>
             </a:r>
           </a:p>
           <a:p>
             <a:r>
-              <a:rPr lang="en-GB" dirty="0"/>
-              <a:t>For “number of neighbours”, “weights” and “algorithm” a Randomized Search was performed to find the best combination of parameters</a:t>
-            </a:r>
-          </a:p>
-          <a:p>
-            <a:r>
-              <a:rPr lang="en-GB" dirty="0"/>
-              <a:t>Options for Randomized Search:</a:t>
-            </a:r>
-          </a:p>
-          <a:p>
-            <a:pPr lvl="1"/>
-            <a:r>
-              <a:rPr lang="en-GB" dirty="0"/>
-              <a:t>Number of neighbours: [5, 10, 12, 16,18]</a:t>
-            </a:r>
-          </a:p>
-          <a:p>
-            <a:pPr lvl="1"/>
-            <a:r>
-              <a:rPr lang="en-GB" dirty="0"/>
-              <a:t>Weights: [uniform, distance]</a:t>
-            </a:r>
-          </a:p>
-          <a:p>
-            <a:pPr lvl="1"/>
-            <a:r>
-              <a:rPr lang="en-GB" dirty="0"/>
-              <a:t>Algorithm: [auto, ball tree, </a:t>
-            </a:r>
-            <a:r>
-              <a:rPr lang="en-GB" dirty="0" err="1"/>
-              <a:t>kd</a:t>
-            </a:r>
-            <a:r>
-              <a:rPr lang="en-GB" dirty="0"/>
-              <a:t> tree, brute]</a:t>
+              <a:rPr lang="en-GB" sz="2400" dirty="0"/>
+              <a:t>For “number of neighbours”, “weights” and “algorithm” a Randomized Search was performed to roughly find the best combination of parameters and then a Grid Search was used to find the final best parameters</a:t>
             </a:r>
           </a:p>
         </p:txBody>

</xml_diff>